<commit_message>
Added new models (SEIQRDP & SIRQN)
</commit_message>
<xml_diff>
--- a/ArsitekturProgram.pptx
+++ b/ArsitekturProgram.pptx
@@ -244,7 +244,7 @@
           <a:p>
             <a:fld id="{350707A7-0D00-460E-9003-9E0C7B84C031}" type="datetimeFigureOut">
               <a:rPr lang="id-ID" smtClean="0"/>
-              <a:t>07/09/2020</a:t>
+              <a:t>09/09/2020</a:t>
             </a:fld>
             <a:endParaRPr lang="id-ID"/>
           </a:p>
@@ -414,7 +414,7 @@
           <a:p>
             <a:fld id="{350707A7-0D00-460E-9003-9E0C7B84C031}" type="datetimeFigureOut">
               <a:rPr lang="id-ID" smtClean="0"/>
-              <a:t>07/09/2020</a:t>
+              <a:t>09/09/2020</a:t>
             </a:fld>
             <a:endParaRPr lang="id-ID"/>
           </a:p>
@@ -594,7 +594,7 @@
           <a:p>
             <a:fld id="{350707A7-0D00-460E-9003-9E0C7B84C031}" type="datetimeFigureOut">
               <a:rPr lang="id-ID" smtClean="0"/>
-              <a:t>07/09/2020</a:t>
+              <a:t>09/09/2020</a:t>
             </a:fld>
             <a:endParaRPr lang="id-ID"/>
           </a:p>
@@ -764,7 +764,7 @@
           <a:p>
             <a:fld id="{350707A7-0D00-460E-9003-9E0C7B84C031}" type="datetimeFigureOut">
               <a:rPr lang="id-ID" smtClean="0"/>
-              <a:t>07/09/2020</a:t>
+              <a:t>09/09/2020</a:t>
             </a:fld>
             <a:endParaRPr lang="id-ID"/>
           </a:p>
@@ -1010,7 +1010,7 @@
           <a:p>
             <a:fld id="{350707A7-0D00-460E-9003-9E0C7B84C031}" type="datetimeFigureOut">
               <a:rPr lang="id-ID" smtClean="0"/>
-              <a:t>07/09/2020</a:t>
+              <a:t>09/09/2020</a:t>
             </a:fld>
             <a:endParaRPr lang="id-ID"/>
           </a:p>
@@ -1242,7 +1242,7 @@
           <a:p>
             <a:fld id="{350707A7-0D00-460E-9003-9E0C7B84C031}" type="datetimeFigureOut">
               <a:rPr lang="id-ID" smtClean="0"/>
-              <a:t>07/09/2020</a:t>
+              <a:t>09/09/2020</a:t>
             </a:fld>
             <a:endParaRPr lang="id-ID"/>
           </a:p>
@@ -1609,7 +1609,7 @@
           <a:p>
             <a:fld id="{350707A7-0D00-460E-9003-9E0C7B84C031}" type="datetimeFigureOut">
               <a:rPr lang="id-ID" smtClean="0"/>
-              <a:t>07/09/2020</a:t>
+              <a:t>09/09/2020</a:t>
             </a:fld>
             <a:endParaRPr lang="id-ID"/>
           </a:p>
@@ -1727,7 +1727,7 @@
           <a:p>
             <a:fld id="{350707A7-0D00-460E-9003-9E0C7B84C031}" type="datetimeFigureOut">
               <a:rPr lang="id-ID" smtClean="0"/>
-              <a:t>07/09/2020</a:t>
+              <a:t>09/09/2020</a:t>
             </a:fld>
             <a:endParaRPr lang="id-ID"/>
           </a:p>
@@ -1822,7 +1822,7 @@
           <a:p>
             <a:fld id="{350707A7-0D00-460E-9003-9E0C7B84C031}" type="datetimeFigureOut">
               <a:rPr lang="id-ID" smtClean="0"/>
-              <a:t>07/09/2020</a:t>
+              <a:t>09/09/2020</a:t>
             </a:fld>
             <a:endParaRPr lang="id-ID"/>
           </a:p>
@@ -2099,7 +2099,7 @@
           <a:p>
             <a:fld id="{350707A7-0D00-460E-9003-9E0C7B84C031}" type="datetimeFigureOut">
               <a:rPr lang="id-ID" smtClean="0"/>
-              <a:t>07/09/2020</a:t>
+              <a:t>09/09/2020</a:t>
             </a:fld>
             <a:endParaRPr lang="id-ID"/>
           </a:p>
@@ -2352,7 +2352,7 @@
           <a:p>
             <a:fld id="{350707A7-0D00-460E-9003-9E0C7B84C031}" type="datetimeFigureOut">
               <a:rPr lang="id-ID" smtClean="0"/>
-              <a:t>07/09/2020</a:t>
+              <a:t>09/09/2020</a:t>
             </a:fld>
             <a:endParaRPr lang="id-ID"/>
           </a:p>
@@ -2565,7 +2565,7 @@
           <a:p>
             <a:fld id="{350707A7-0D00-460E-9003-9E0C7B84C031}" type="datetimeFigureOut">
               <a:rPr lang="id-ID" smtClean="0"/>
-              <a:t>07/09/2020</a:t>
+              <a:t>09/09/2020</a:t>
             </a:fld>
             <a:endParaRPr lang="id-ID"/>
           </a:p>
@@ -2979,7 +2979,7 @@
         <p:grpSpPr>
           <a:xfrm>
             <a:off x="8451514" y="221780"/>
-            <a:ext cx="1567396" cy="3334189"/>
+            <a:ext cx="1567396" cy="3249035"/>
             <a:chOff x="8166800" y="238157"/>
             <a:chExt cx="1567396" cy="3334189"/>
           </a:xfrm>
@@ -3194,10 +3194,10 @@
         </p:nvGrpSpPr>
         <p:grpSpPr>
           <a:xfrm>
-            <a:off x="9204357" y="5340923"/>
-            <a:ext cx="2875991" cy="1243335"/>
+            <a:off x="9204406" y="5306327"/>
+            <a:ext cx="2875991" cy="1538316"/>
             <a:chOff x="9204357" y="5340923"/>
-            <a:chExt cx="2875991" cy="1243335"/>
+            <a:chExt cx="2875991" cy="1260742"/>
           </a:xfrm>
         </p:grpSpPr>
         <p:sp>
@@ -3260,7 +3260,7 @@
           <p:spPr>
             <a:xfrm>
               <a:off x="9269607" y="5617924"/>
-              <a:ext cx="2387856" cy="923330"/>
+              <a:ext cx="2387856" cy="983741"/>
             </a:xfrm>
             <a:prstGeom prst="rect">
               <a:avLst/>
@@ -3276,6 +3276,13 @@
               <a:r>
                 <a:rPr lang="en-US" dirty="0" err="1" smtClean="0"/>
                 <a:t>fOde.m</a:t>
+              </a:r>
+              <a:endParaRPr lang="en-US" dirty="0" smtClean="0"/>
+            </a:p>
+            <a:p>
+              <a:r>
+                <a:rPr lang="en-US" dirty="0" smtClean="0"/>
+                <a:t>calcR0.m</a:t>
               </a:r>
               <a:endParaRPr lang="en-US" dirty="0" smtClean="0"/>
             </a:p>
@@ -3461,8 +3468,8 @@
         </p:nvGrpSpPr>
         <p:grpSpPr>
           <a:xfrm>
-            <a:off x="10224491" y="213093"/>
-            <a:ext cx="1502778" cy="3308705"/>
+            <a:off x="10224491" y="213094"/>
+            <a:ext cx="1502778" cy="3257722"/>
             <a:chOff x="10224491" y="213093"/>
             <a:chExt cx="1502778" cy="3308705"/>
           </a:xfrm>
@@ -3551,10 +3558,10 @@
         </p:nvGrpSpPr>
         <p:grpSpPr>
           <a:xfrm>
-            <a:off x="8846722" y="3964711"/>
-            <a:ext cx="3233626" cy="1376212"/>
-            <a:chOff x="8846722" y="3964711"/>
-            <a:chExt cx="3233626" cy="1376212"/>
+            <a:off x="8846722" y="3734380"/>
+            <a:ext cx="3209747" cy="1646370"/>
+            <a:chOff x="8846722" y="3750973"/>
+            <a:chExt cx="3197782" cy="1389746"/>
           </a:xfrm>
         </p:grpSpPr>
         <p:sp>
@@ -3565,7 +3572,7 @@
           </p:nvSpPr>
           <p:spPr>
             <a:xfrm>
-              <a:off x="9204357" y="3964711"/>
+              <a:off x="9168513" y="3750973"/>
               <a:ext cx="2875991" cy="1210300"/>
             </a:xfrm>
             <a:prstGeom prst="roundRect">
@@ -3612,8 +3619,8 @@
           </p:nvSpPr>
           <p:spPr>
             <a:xfrm>
-              <a:off x="9269607" y="4251680"/>
-              <a:ext cx="2810740" cy="923330"/>
+              <a:off x="9219327" y="3940390"/>
+              <a:ext cx="2810740" cy="1200329"/>
             </a:xfrm>
             <a:prstGeom prst="rect">
               <a:avLst/>
@@ -3629,6 +3636,13 @@
               <a:r>
                 <a:rPr lang="en-US" dirty="0" err="1" smtClean="0"/>
                 <a:t>fOde.m</a:t>
+              </a:r>
+              <a:endParaRPr lang="en-US" dirty="0" smtClean="0"/>
+            </a:p>
+            <a:p>
+              <a:r>
+                <a:rPr lang="en-US" dirty="0" smtClean="0"/>
+                <a:t>calcR0.m</a:t>
               </a:r>
               <a:endParaRPr lang="en-US" dirty="0" smtClean="0"/>
             </a:p>
@@ -3661,8 +3675,8 @@
           </p:nvCxnSpPr>
           <p:spPr>
             <a:xfrm flipH="1">
-              <a:off x="8846722" y="4569861"/>
-              <a:ext cx="357635" cy="771062"/>
+              <a:off x="8846722" y="4356124"/>
+              <a:ext cx="321791" cy="750976"/>
             </a:xfrm>
             <a:prstGeom prst="straightConnector1">
               <a:avLst/>
@@ -3702,7 +3716,7 @@
         <p:spPr>
           <a:xfrm flipH="1" flipV="1">
             <a:off x="8846722" y="5340923"/>
-            <a:ext cx="357635" cy="621668"/>
+            <a:ext cx="357684" cy="723943"/>
           </a:xfrm>
           <a:prstGeom prst="straightConnector1">
             <a:avLst/>
@@ -3779,8 +3793,8 @@
         </p:nvCxnSpPr>
         <p:spPr>
           <a:xfrm flipV="1">
-            <a:off x="7408727" y="3555969"/>
-            <a:ext cx="1826485" cy="483952"/>
+            <a:off x="7408727" y="3470815"/>
+            <a:ext cx="1826485" cy="569106"/>
           </a:xfrm>
           <a:prstGeom prst="straightConnector1">
             <a:avLst/>
@@ -3857,8 +3871,8 @@
         </p:nvCxnSpPr>
         <p:spPr>
           <a:xfrm flipV="1">
-            <a:off x="7408727" y="3521798"/>
-            <a:ext cx="3567153" cy="518123"/>
+            <a:off x="7408727" y="3470816"/>
+            <a:ext cx="3567153" cy="569105"/>
           </a:xfrm>
           <a:prstGeom prst="straightConnector1">
             <a:avLst/>

</xml_diff>

<commit_message>
Model name definition moved to models/modelName/config.txt
</commit_message>
<xml_diff>
--- a/ArsitekturProgram.pptx
+++ b/ArsitekturProgram.pptx
@@ -6,7 +6,8 @@
   </p:sldMasterIdLst>
   <p:sldIdLst>
     <p:sldId id="257" r:id="rId2"/>
-    <p:sldId id="258" r:id="rId3"/>
+    <p:sldId id="259" r:id="rId3"/>
+    <p:sldId id="258" r:id="rId4"/>
   </p:sldIdLst>
   <p:sldSz cx="12192000" cy="6858000"/>
   <p:notesSz cx="6858000" cy="9144000"/>
@@ -244,7 +245,7 @@
           <a:p>
             <a:fld id="{350707A7-0D00-460E-9003-9E0C7B84C031}" type="datetimeFigureOut">
               <a:rPr lang="id-ID" smtClean="0"/>
-              <a:t>09/09/2020</a:t>
+              <a:t>01/11/2020</a:t>
             </a:fld>
             <a:endParaRPr lang="id-ID"/>
           </a:p>
@@ -414,7 +415,7 @@
           <a:p>
             <a:fld id="{350707A7-0D00-460E-9003-9E0C7B84C031}" type="datetimeFigureOut">
               <a:rPr lang="id-ID" smtClean="0"/>
-              <a:t>09/09/2020</a:t>
+              <a:t>01/11/2020</a:t>
             </a:fld>
             <a:endParaRPr lang="id-ID"/>
           </a:p>
@@ -594,7 +595,7 @@
           <a:p>
             <a:fld id="{350707A7-0D00-460E-9003-9E0C7B84C031}" type="datetimeFigureOut">
               <a:rPr lang="id-ID" smtClean="0"/>
-              <a:t>09/09/2020</a:t>
+              <a:t>01/11/2020</a:t>
             </a:fld>
             <a:endParaRPr lang="id-ID"/>
           </a:p>
@@ -764,7 +765,7 @@
           <a:p>
             <a:fld id="{350707A7-0D00-460E-9003-9E0C7B84C031}" type="datetimeFigureOut">
               <a:rPr lang="id-ID" smtClean="0"/>
-              <a:t>09/09/2020</a:t>
+              <a:t>01/11/2020</a:t>
             </a:fld>
             <a:endParaRPr lang="id-ID"/>
           </a:p>
@@ -1010,7 +1011,7 @@
           <a:p>
             <a:fld id="{350707A7-0D00-460E-9003-9E0C7B84C031}" type="datetimeFigureOut">
               <a:rPr lang="id-ID" smtClean="0"/>
-              <a:t>09/09/2020</a:t>
+              <a:t>01/11/2020</a:t>
             </a:fld>
             <a:endParaRPr lang="id-ID"/>
           </a:p>
@@ -1242,7 +1243,7 @@
           <a:p>
             <a:fld id="{350707A7-0D00-460E-9003-9E0C7B84C031}" type="datetimeFigureOut">
               <a:rPr lang="id-ID" smtClean="0"/>
-              <a:t>09/09/2020</a:t>
+              <a:t>01/11/2020</a:t>
             </a:fld>
             <a:endParaRPr lang="id-ID"/>
           </a:p>
@@ -1609,7 +1610,7 @@
           <a:p>
             <a:fld id="{350707A7-0D00-460E-9003-9E0C7B84C031}" type="datetimeFigureOut">
               <a:rPr lang="id-ID" smtClean="0"/>
-              <a:t>09/09/2020</a:t>
+              <a:t>01/11/2020</a:t>
             </a:fld>
             <a:endParaRPr lang="id-ID"/>
           </a:p>
@@ -1727,7 +1728,7 @@
           <a:p>
             <a:fld id="{350707A7-0D00-460E-9003-9E0C7B84C031}" type="datetimeFigureOut">
               <a:rPr lang="id-ID" smtClean="0"/>
-              <a:t>09/09/2020</a:t>
+              <a:t>01/11/2020</a:t>
             </a:fld>
             <a:endParaRPr lang="id-ID"/>
           </a:p>
@@ -1822,7 +1823,7 @@
           <a:p>
             <a:fld id="{350707A7-0D00-460E-9003-9E0C7B84C031}" type="datetimeFigureOut">
               <a:rPr lang="id-ID" smtClean="0"/>
-              <a:t>09/09/2020</a:t>
+              <a:t>01/11/2020</a:t>
             </a:fld>
             <a:endParaRPr lang="id-ID"/>
           </a:p>
@@ -2099,7 +2100,7 @@
           <a:p>
             <a:fld id="{350707A7-0D00-460E-9003-9E0C7B84C031}" type="datetimeFigureOut">
               <a:rPr lang="id-ID" smtClean="0"/>
-              <a:t>09/09/2020</a:t>
+              <a:t>01/11/2020</a:t>
             </a:fld>
             <a:endParaRPr lang="id-ID"/>
           </a:p>
@@ -2352,7 +2353,7 @@
           <a:p>
             <a:fld id="{350707A7-0D00-460E-9003-9E0C7B84C031}" type="datetimeFigureOut">
               <a:rPr lang="id-ID" smtClean="0"/>
-              <a:t>09/09/2020</a:t>
+              <a:t>01/11/2020</a:t>
             </a:fld>
             <a:endParaRPr lang="id-ID"/>
           </a:p>
@@ -2565,7 +2566,7 @@
           <a:p>
             <a:fld id="{350707A7-0D00-460E-9003-9E0C7B84C031}" type="datetimeFigureOut">
               <a:rPr lang="id-ID" smtClean="0"/>
-              <a:t>09/09/2020</a:t>
+              <a:t>01/11/2020</a:t>
             </a:fld>
             <a:endParaRPr lang="id-ID"/>
           </a:p>
@@ -2972,6 +2973,1359 @@
       </p:grpSpPr>
       <p:grpSp>
         <p:nvGrpSpPr>
+          <p:cNvPr id="44" name="Group 43"/>
+          <p:cNvGrpSpPr/>
+          <p:nvPr/>
+        </p:nvGrpSpPr>
+        <p:grpSpPr>
+          <a:xfrm>
+            <a:off x="5306051" y="3440821"/>
+            <a:ext cx="2875991" cy="3132798"/>
+            <a:chOff x="5970731" y="4039921"/>
+            <a:chExt cx="2875991" cy="2602003"/>
+          </a:xfrm>
+        </p:grpSpPr>
+        <p:sp>
+          <p:nvSpPr>
+            <p:cNvPr id="23" name="Rounded Rectangle 22"/>
+            <p:cNvSpPr/>
+            <p:nvPr/>
+          </p:nvSpPr>
+          <p:spPr>
+            <a:xfrm>
+              <a:off x="5970731" y="4039921"/>
+              <a:ext cx="2875991" cy="2602003"/>
+            </a:xfrm>
+            <a:prstGeom prst="roundRect">
+              <a:avLst/>
+            </a:prstGeom>
+            <a:ln w="38100">
+              <a:solidFill>
+                <a:srgbClr val="7030A0"/>
+              </a:solidFill>
+            </a:ln>
+          </p:spPr>
+          <p:style>
+            <a:lnRef idx="2">
+              <a:schemeClr val="accent6"/>
+            </a:lnRef>
+            <a:fillRef idx="1">
+              <a:schemeClr val="lt1"/>
+            </a:fillRef>
+            <a:effectRef idx="0">
+              <a:schemeClr val="accent6"/>
+            </a:effectRef>
+            <a:fontRef idx="minor">
+              <a:schemeClr val="dk1"/>
+            </a:fontRef>
+          </p:style>
+          <p:txBody>
+            <a:bodyPr rtlCol="0" anchor="t"/>
+            <a:lstStyle/>
+            <a:p>
+              <a:pPr algn="ctr"/>
+              <a:r>
+                <a:rPr lang="en-US" i="1" dirty="0" err="1" smtClean="0"/>
+                <a:t>commonFunctions</a:t>
+              </a:r>
+              <a:endParaRPr lang="id-ID" i="1" dirty="0"/>
+            </a:p>
+          </p:txBody>
+        </p:sp>
+        <p:sp>
+          <p:nvSpPr>
+            <p:cNvPr id="24" name="TextBox 23"/>
+            <p:cNvSpPr txBox="1"/>
+            <p:nvPr/>
+          </p:nvSpPr>
+          <p:spPr>
+            <a:xfrm>
+              <a:off x="6241174" y="4581766"/>
+              <a:ext cx="2080795" cy="1754326"/>
+            </a:xfrm>
+            <a:prstGeom prst="rect">
+              <a:avLst/>
+            </a:prstGeom>
+            <a:noFill/>
+          </p:spPr>
+          <p:txBody>
+            <a:bodyPr wrap="square" rtlCol="0">
+              <a:spAutoFit/>
+            </a:bodyPr>
+            <a:lstStyle/>
+            <a:p>
+              <a:r>
+                <a:rPr lang="en-US" dirty="0" err="1" smtClean="0"/>
+                <a:t>fitModel.m</a:t>
+              </a:r>
+              <a:endParaRPr lang="en-US" dirty="0" smtClean="0"/>
+            </a:p>
+            <a:p>
+              <a:r>
+                <a:rPr lang="en-US" dirty="0" err="1" smtClean="0"/>
+                <a:t>simulateModel.m</a:t>
+              </a:r>
+              <a:endParaRPr lang="en-US" dirty="0" smtClean="0"/>
+            </a:p>
+            <a:p>
+              <a:r>
+                <a:rPr lang="en-US" dirty="0" err="1" smtClean="0"/>
+                <a:t>plotAllStates.m</a:t>
+              </a:r>
+              <a:endParaRPr lang="en-US" dirty="0" smtClean="0"/>
+            </a:p>
+            <a:p>
+              <a:r>
+                <a:rPr lang="en-US" dirty="0" err="1" smtClean="0"/>
+                <a:t>plotFittingStates.m</a:t>
+              </a:r>
+              <a:endParaRPr lang="en-US" dirty="0" smtClean="0"/>
+            </a:p>
+            <a:p>
+              <a:r>
+                <a:rPr lang="en-US" dirty="0" err="1" smtClean="0"/>
+                <a:t>plotCustomStates.m</a:t>
+              </a:r>
+              <a:endParaRPr lang="en-US" dirty="0" smtClean="0"/>
+            </a:p>
+            <a:p>
+              <a:r>
+                <a:rPr lang="en-US" dirty="0" smtClean="0"/>
+                <a:t>…</a:t>
+              </a:r>
+            </a:p>
+          </p:txBody>
+        </p:sp>
+      </p:grpSp>
+      <p:grpSp>
+        <p:nvGrpSpPr>
+          <p:cNvPr id="9" name="Group 8"/>
+          <p:cNvGrpSpPr/>
+          <p:nvPr/>
+        </p:nvGrpSpPr>
+        <p:grpSpPr>
+          <a:xfrm>
+            <a:off x="5167691" y="212072"/>
+            <a:ext cx="3154278" cy="2822836"/>
+            <a:chOff x="4697233" y="213093"/>
+            <a:chExt cx="3154278" cy="3308705"/>
+          </a:xfrm>
+        </p:grpSpPr>
+        <p:sp>
+          <p:nvSpPr>
+            <p:cNvPr id="14" name="Rectangle 13"/>
+            <p:cNvSpPr/>
+            <p:nvPr/>
+          </p:nvSpPr>
+          <p:spPr>
+            <a:xfrm>
+              <a:off x="4697233" y="213093"/>
+              <a:ext cx="3154278" cy="3308705"/>
+            </a:xfrm>
+            <a:prstGeom prst="rect">
+              <a:avLst/>
+            </a:prstGeom>
+            <a:ln w="28575"/>
+          </p:spPr>
+          <p:style>
+            <a:lnRef idx="2">
+              <a:schemeClr val="accent5"/>
+            </a:lnRef>
+            <a:fillRef idx="1">
+              <a:schemeClr val="lt1"/>
+            </a:fillRef>
+            <a:effectRef idx="0">
+              <a:schemeClr val="accent5"/>
+            </a:effectRef>
+            <a:fontRef idx="minor">
+              <a:schemeClr val="dk1"/>
+            </a:fontRef>
+          </p:style>
+          <p:txBody>
+            <a:bodyPr rtlCol="0" anchor="t"/>
+            <a:lstStyle/>
+            <a:p>
+              <a:pPr algn="ctr"/>
+              <a:r>
+                <a:rPr lang="en-US" sz="2400" i="1" dirty="0" smtClean="0"/>
+                <a:t>Surabaya</a:t>
+              </a:r>
+              <a:endParaRPr lang="id-ID" sz="2400" i="1" dirty="0"/>
+            </a:p>
+          </p:txBody>
+        </p:sp>
+        <p:sp>
+          <p:nvSpPr>
+            <p:cNvPr id="16" name="TextBox 15"/>
+            <p:cNvSpPr txBox="1"/>
+            <p:nvPr/>
+          </p:nvSpPr>
+          <p:spPr>
+            <a:xfrm>
+              <a:off x="4782433" y="635802"/>
+              <a:ext cx="3069078" cy="1815882"/>
+            </a:xfrm>
+            <a:prstGeom prst="rect">
+              <a:avLst/>
+            </a:prstGeom>
+            <a:noFill/>
+          </p:spPr>
+          <p:txBody>
+            <a:bodyPr wrap="square" rtlCol="0">
+              <a:spAutoFit/>
+            </a:bodyPr>
+            <a:lstStyle/>
+            <a:p>
+              <a:r>
+                <a:rPr lang="en-US" sz="1600" dirty="0" smtClean="0"/>
+                <a:t>COVID19_Surabaya.xls &amp; *</a:t>
+              </a:r>
+              <a:r>
+                <a:rPr lang="en-US" sz="1600" dirty="0" err="1" smtClean="0"/>
+                <a:t>csv</a:t>
+              </a:r>
+              <a:endParaRPr lang="en-US" sz="1600" dirty="0"/>
+            </a:p>
+            <a:p>
+              <a:endParaRPr lang="en-US" sz="1600" dirty="0" smtClean="0"/>
+            </a:p>
+            <a:p>
+              <a:r>
+                <a:rPr lang="en-US" sz="1600" dirty="0" err="1" smtClean="0"/>
+                <a:t>mainSurabayaModelSIRQN.m</a:t>
+              </a:r>
+              <a:endParaRPr lang="en-US" sz="1600" dirty="0" smtClean="0"/>
+            </a:p>
+            <a:p>
+              <a:r>
+                <a:rPr lang="en-US" sz="1600" dirty="0" err="1" smtClean="0"/>
+                <a:t>mainSurabayaModelSQRshadow.m</a:t>
+              </a:r>
+              <a:endParaRPr lang="en-US" sz="1600" dirty="0" smtClean="0"/>
+            </a:p>
+            <a:p>
+              <a:endParaRPr lang="en-US" sz="1600" dirty="0" smtClean="0"/>
+            </a:p>
+            <a:p>
+              <a:r>
+                <a:rPr lang="en-US" sz="1600" dirty="0" err="1" smtClean="0"/>
+                <a:t>getDataModelSIRQN.m</a:t>
+              </a:r>
+              <a:endParaRPr lang="en-US" sz="1600" dirty="0" smtClean="0"/>
+            </a:p>
+            <a:p>
+              <a:r>
+                <a:rPr lang="en-US" sz="1600" dirty="0" err="1" smtClean="0"/>
+                <a:t>getDataModelSQRshadow.m</a:t>
+              </a:r>
+              <a:endParaRPr lang="en-US" sz="1600" dirty="0" smtClean="0"/>
+            </a:p>
+          </p:txBody>
+        </p:sp>
+        <p:sp>
+          <p:nvSpPr>
+            <p:cNvPr id="28" name="TextBox 27"/>
+            <p:cNvSpPr txBox="1"/>
+            <p:nvPr/>
+          </p:nvSpPr>
+          <p:spPr>
+            <a:xfrm rot="19305262">
+              <a:off x="5679252" y="2603283"/>
+              <a:ext cx="1136226" cy="369332"/>
+            </a:xfrm>
+            <a:prstGeom prst="rect">
+              <a:avLst/>
+            </a:prstGeom>
+            <a:noFill/>
+          </p:spPr>
+          <p:txBody>
+            <a:bodyPr wrap="square" rtlCol="0">
+              <a:spAutoFit/>
+            </a:bodyPr>
+            <a:lstStyle/>
+            <a:p>
+              <a:r>
+                <a:rPr lang="en-US" dirty="0" smtClean="0"/>
+                <a:t>----//----</a:t>
+              </a:r>
+            </a:p>
+          </p:txBody>
+        </p:sp>
+      </p:grpSp>
+      <p:cxnSp>
+        <p:nvCxnSpPr>
+          <p:cNvPr id="48" name="Straight Arrow Connector 47"/>
+          <p:cNvCxnSpPr>
+            <a:stCxn id="23" idx="1"/>
+            <a:endCxn id="4" idx="3"/>
+          </p:cNvCxnSpPr>
+          <p:nvPr/>
+        </p:nvCxnSpPr>
+        <p:spPr>
+          <a:xfrm flipH="1" flipV="1">
+            <a:off x="4843851" y="3473414"/>
+            <a:ext cx="462200" cy="1533806"/>
+          </a:xfrm>
+          <a:prstGeom prst="straightConnector1">
+            <a:avLst/>
+          </a:prstGeom>
+          <a:ln w="57150">
+            <a:solidFill>
+              <a:schemeClr val="tx1"/>
+            </a:solidFill>
+            <a:tailEnd type="triangle"/>
+          </a:ln>
+        </p:spPr>
+        <p:style>
+          <a:lnRef idx="1">
+            <a:schemeClr val="accent1"/>
+          </a:lnRef>
+          <a:fillRef idx="0">
+            <a:schemeClr val="accent1"/>
+          </a:fillRef>
+          <a:effectRef idx="0">
+            <a:schemeClr val="accent1"/>
+          </a:effectRef>
+          <a:fontRef idx="minor">
+            <a:schemeClr val="tx1"/>
+          </a:fontRef>
+        </p:style>
+      </p:cxnSp>
+      <p:cxnSp>
+        <p:nvCxnSpPr>
+          <p:cNvPr id="55" name="Straight Arrow Connector 54"/>
+          <p:cNvCxnSpPr>
+            <a:stCxn id="23" idx="0"/>
+            <a:endCxn id="14" idx="2"/>
+          </p:cNvCxnSpPr>
+          <p:nvPr/>
+        </p:nvCxnSpPr>
+        <p:spPr>
+          <a:xfrm flipV="1">
+            <a:off x="6744047" y="3034908"/>
+            <a:ext cx="783" cy="405913"/>
+          </a:xfrm>
+          <a:prstGeom prst="straightConnector1">
+            <a:avLst/>
+          </a:prstGeom>
+          <a:ln w="57150">
+            <a:solidFill>
+              <a:schemeClr val="tx1"/>
+            </a:solidFill>
+            <a:tailEnd type="triangle"/>
+          </a:ln>
+        </p:spPr>
+        <p:style>
+          <a:lnRef idx="1">
+            <a:schemeClr val="accent1"/>
+          </a:lnRef>
+          <a:fillRef idx="0">
+            <a:schemeClr val="accent1"/>
+          </a:fillRef>
+          <a:effectRef idx="0">
+            <a:schemeClr val="accent1"/>
+          </a:effectRef>
+          <a:fontRef idx="minor">
+            <a:schemeClr val="tx1"/>
+          </a:fontRef>
+        </p:style>
+      </p:cxnSp>
+      <p:cxnSp>
+        <p:nvCxnSpPr>
+          <p:cNvPr id="39" name="Straight Arrow Connector 38"/>
+          <p:cNvCxnSpPr>
+            <a:stCxn id="60" idx="1"/>
+            <a:endCxn id="23" idx="3"/>
+          </p:cNvCxnSpPr>
+          <p:nvPr/>
+        </p:nvCxnSpPr>
+        <p:spPr>
+          <a:xfrm flipH="1">
+            <a:off x="8182042" y="4955392"/>
+            <a:ext cx="654654" cy="51828"/>
+          </a:xfrm>
+          <a:prstGeom prst="straightConnector1">
+            <a:avLst/>
+          </a:prstGeom>
+          <a:ln w="57150">
+            <a:solidFill>
+              <a:schemeClr val="tx1"/>
+            </a:solidFill>
+            <a:tailEnd type="triangle"/>
+          </a:ln>
+        </p:spPr>
+        <p:style>
+          <a:lnRef idx="1">
+            <a:schemeClr val="accent1"/>
+          </a:lnRef>
+          <a:fillRef idx="0">
+            <a:schemeClr val="accent1"/>
+          </a:fillRef>
+          <a:effectRef idx="0">
+            <a:schemeClr val="accent1"/>
+          </a:effectRef>
+          <a:fontRef idx="minor">
+            <a:schemeClr val="tx1"/>
+          </a:fontRef>
+        </p:style>
+      </p:cxnSp>
+      <p:grpSp>
+        <p:nvGrpSpPr>
+          <p:cNvPr id="46" name="Group 45"/>
+          <p:cNvGrpSpPr/>
+          <p:nvPr/>
+        </p:nvGrpSpPr>
+        <p:grpSpPr>
+          <a:xfrm>
+            <a:off x="514190" y="212071"/>
+            <a:ext cx="4372850" cy="6522686"/>
+            <a:chOff x="514190" y="212071"/>
+            <a:chExt cx="4372850" cy="6522686"/>
+          </a:xfrm>
+        </p:grpSpPr>
+        <p:sp>
+          <p:nvSpPr>
+            <p:cNvPr id="4" name="Rectangle 3"/>
+            <p:cNvSpPr/>
+            <p:nvPr/>
+          </p:nvSpPr>
+          <p:spPr>
+            <a:xfrm>
+              <a:off x="514190" y="212071"/>
+              <a:ext cx="4329661" cy="6522686"/>
+            </a:xfrm>
+            <a:prstGeom prst="rect">
+              <a:avLst/>
+            </a:prstGeom>
+            <a:ln w="28575"/>
+          </p:spPr>
+          <p:style>
+            <a:lnRef idx="2">
+              <a:schemeClr val="accent5"/>
+            </a:lnRef>
+            <a:fillRef idx="1">
+              <a:schemeClr val="lt1"/>
+            </a:fillRef>
+            <a:effectRef idx="0">
+              <a:schemeClr val="accent5"/>
+            </a:effectRef>
+            <a:fontRef idx="minor">
+              <a:schemeClr val="dk1"/>
+            </a:fontRef>
+          </p:style>
+          <p:txBody>
+            <a:bodyPr rtlCol="0" anchor="t"/>
+            <a:lstStyle/>
+            <a:p>
+              <a:pPr algn="ctr"/>
+              <a:r>
+                <a:rPr lang="en-US" sz="2400" i="1" dirty="0" err="1" smtClean="0"/>
+                <a:t>DKI_Jakarta</a:t>
+              </a:r>
+              <a:endParaRPr lang="id-ID" sz="2400" i="1" dirty="0"/>
+            </a:p>
+          </p:txBody>
+        </p:sp>
+        <p:sp>
+          <p:nvSpPr>
+            <p:cNvPr id="8" name="TextBox 7"/>
+            <p:cNvSpPr txBox="1"/>
+            <p:nvPr/>
+          </p:nvSpPr>
+          <p:spPr>
+            <a:xfrm>
+              <a:off x="871825" y="547721"/>
+              <a:ext cx="4015215" cy="2893100"/>
+            </a:xfrm>
+            <a:prstGeom prst="rect">
+              <a:avLst/>
+            </a:prstGeom>
+            <a:noFill/>
+          </p:spPr>
+          <p:txBody>
+            <a:bodyPr wrap="square" rtlCol="0">
+              <a:spAutoFit/>
+            </a:bodyPr>
+            <a:lstStyle/>
+            <a:p>
+              <a:r>
+                <a:rPr lang="en-US" sz="1600" dirty="0" smtClean="0"/>
+                <a:t>COVID19_DkiJakarta_IstilahLama.xls &amp; *.</a:t>
+              </a:r>
+              <a:r>
+                <a:rPr lang="en-US" sz="1600" dirty="0" err="1" smtClean="0"/>
+                <a:t>csv</a:t>
+              </a:r>
+              <a:endParaRPr lang="en-US" sz="1600" dirty="0"/>
+            </a:p>
+            <a:p>
+              <a:r>
+                <a:rPr lang="en-US" sz="1600" dirty="0" smtClean="0"/>
+                <a:t>COVID19_DkiJakarta_IstilahBaru.xls &amp; *.</a:t>
+              </a:r>
+              <a:r>
+                <a:rPr lang="en-US" sz="1600" dirty="0" err="1" smtClean="0"/>
+                <a:t>csv</a:t>
+              </a:r>
+              <a:endParaRPr lang="id-ID" sz="1600" dirty="0"/>
+            </a:p>
+            <a:p>
+              <a:endParaRPr lang="en-US" sz="1600" dirty="0" smtClean="0"/>
+            </a:p>
+            <a:p>
+              <a:r>
+                <a:rPr lang="en-US" sz="1600" dirty="0" err="1" smtClean="0"/>
+                <a:t>mainDkiJakartaModelSIRQN.m</a:t>
+              </a:r>
+              <a:endParaRPr lang="en-US" sz="1600" dirty="0" smtClean="0"/>
+            </a:p>
+            <a:p>
+              <a:r>
+                <a:rPr lang="en-US" sz="1600" dirty="0" err="1" smtClean="0"/>
+                <a:t>mainDkiJakartaModelSQRshadow.m</a:t>
+              </a:r>
+              <a:endParaRPr lang="en-US" sz="1600" dirty="0" smtClean="0"/>
+            </a:p>
+            <a:p>
+              <a:endParaRPr lang="en-US" sz="1600" dirty="0" smtClean="0"/>
+            </a:p>
+            <a:p>
+              <a:r>
+                <a:rPr lang="en-US" sz="1600" dirty="0" err="1" smtClean="0"/>
+                <a:t>getDataIstilahLamaModelSIRQN.m</a:t>
+              </a:r>
+              <a:endParaRPr lang="en-US" sz="1600" dirty="0" smtClean="0"/>
+            </a:p>
+            <a:p>
+              <a:r>
+                <a:rPr lang="en-US" sz="1600" dirty="0" err="1" smtClean="0"/>
+                <a:t>getDataIstilahBaruModelSIRQN.m</a:t>
+              </a:r>
+              <a:endParaRPr lang="en-US" sz="1600" dirty="0" smtClean="0"/>
+            </a:p>
+            <a:p>
+              <a:r>
+                <a:rPr lang="en-US" sz="1600" dirty="0" err="1" smtClean="0"/>
+                <a:t>getDataIstilahLamaModelSQRshadow.m</a:t>
+              </a:r>
+              <a:endParaRPr lang="en-US" sz="1600" dirty="0" smtClean="0"/>
+            </a:p>
+            <a:p>
+              <a:r>
+                <a:rPr lang="en-US" sz="1600" dirty="0" err="1" smtClean="0"/>
+                <a:t>getDataIstilahBaruModelSQRshadow.m</a:t>
+              </a:r>
+              <a:endParaRPr lang="en-US" sz="1600" dirty="0" smtClean="0"/>
+            </a:p>
+            <a:p>
+              <a:endParaRPr lang="en-US" dirty="0" smtClean="0"/>
+            </a:p>
+          </p:txBody>
+        </p:sp>
+        <p:sp>
+          <p:nvSpPr>
+            <p:cNvPr id="32" name="Rectangle 31"/>
+            <p:cNvSpPr/>
+            <p:nvPr/>
+          </p:nvSpPr>
+          <p:spPr>
+            <a:xfrm>
+              <a:off x="642798" y="3111543"/>
+              <a:ext cx="4120503" cy="3530381"/>
+            </a:xfrm>
+            <a:prstGeom prst="rect">
+              <a:avLst/>
+            </a:prstGeom>
+            <a:ln w="28575">
+              <a:solidFill>
+                <a:schemeClr val="tx1"/>
+              </a:solidFill>
+            </a:ln>
+          </p:spPr>
+          <p:style>
+            <a:lnRef idx="2">
+              <a:schemeClr val="accent6"/>
+            </a:lnRef>
+            <a:fillRef idx="1">
+              <a:schemeClr val="lt1"/>
+            </a:fillRef>
+            <a:effectRef idx="0">
+              <a:schemeClr val="accent6"/>
+            </a:effectRef>
+            <a:fontRef idx="minor">
+              <a:schemeClr val="dk1"/>
+            </a:fontRef>
+          </p:style>
+          <p:txBody>
+            <a:bodyPr rtlCol="0" anchor="t"/>
+            <a:lstStyle/>
+            <a:p>
+              <a:pPr algn="ctr"/>
+              <a:r>
+                <a:rPr lang="en-US" i="1" dirty="0" smtClean="0"/>
+                <a:t>results</a:t>
+              </a:r>
+              <a:endParaRPr lang="id-ID" i="1" dirty="0"/>
+            </a:p>
+          </p:txBody>
+        </p:sp>
+        <p:sp>
+          <p:nvSpPr>
+            <p:cNvPr id="49" name="Rectangle 48"/>
+            <p:cNvSpPr/>
+            <p:nvPr/>
+          </p:nvSpPr>
+          <p:spPr>
+            <a:xfrm>
+              <a:off x="715224" y="3473413"/>
+              <a:ext cx="3990919" cy="2275537"/>
+            </a:xfrm>
+            <a:prstGeom prst="rect">
+              <a:avLst/>
+            </a:prstGeom>
+            <a:ln w="28575">
+              <a:solidFill>
+                <a:srgbClr val="FF0000"/>
+              </a:solidFill>
+            </a:ln>
+          </p:spPr>
+          <p:style>
+            <a:lnRef idx="2">
+              <a:schemeClr val="accent6"/>
+            </a:lnRef>
+            <a:fillRef idx="1">
+              <a:schemeClr val="lt1"/>
+            </a:fillRef>
+            <a:effectRef idx="0">
+              <a:schemeClr val="accent6"/>
+            </a:effectRef>
+            <a:fontRef idx="minor">
+              <a:schemeClr val="dk1"/>
+            </a:fontRef>
+          </p:style>
+          <p:txBody>
+            <a:bodyPr rtlCol="0" anchor="t"/>
+            <a:lstStyle/>
+            <a:p>
+              <a:pPr algn="ctr"/>
+              <a:r>
+                <a:rPr lang="en-US" sz="1600" i="1" dirty="0" smtClean="0"/>
+                <a:t>SIRQN</a:t>
+              </a:r>
+              <a:endParaRPr lang="id-ID" sz="1600" i="1" dirty="0"/>
+            </a:p>
+          </p:txBody>
+        </p:sp>
+        <p:sp>
+          <p:nvSpPr>
+            <p:cNvPr id="33" name="Rectangle 32"/>
+            <p:cNvSpPr/>
+            <p:nvPr/>
+          </p:nvSpPr>
+          <p:spPr>
+            <a:xfrm>
+              <a:off x="871824" y="3806379"/>
+              <a:ext cx="3747043" cy="1272616"/>
+            </a:xfrm>
+            <a:prstGeom prst="rect">
+              <a:avLst/>
+            </a:prstGeom>
+            <a:ln w="28575">
+              <a:solidFill>
+                <a:schemeClr val="tx1"/>
+              </a:solidFill>
+              <a:prstDash val="dash"/>
+            </a:ln>
+          </p:spPr>
+          <p:style>
+            <a:lnRef idx="2">
+              <a:schemeClr val="accent6"/>
+            </a:lnRef>
+            <a:fillRef idx="1">
+              <a:schemeClr val="lt1"/>
+            </a:fillRef>
+            <a:effectRef idx="0">
+              <a:schemeClr val="accent6"/>
+            </a:effectRef>
+            <a:fontRef idx="minor">
+              <a:schemeClr val="dk1"/>
+            </a:fontRef>
+          </p:style>
+          <p:txBody>
+            <a:bodyPr rtlCol="0" anchor="t"/>
+            <a:lstStyle/>
+            <a:p>
+              <a:pPr algn="ctr"/>
+              <a:r>
+                <a:rPr lang="en-US" sz="1600" i="1" dirty="0" smtClean="0"/>
+                <a:t>tanggalTerakhirFitting1keteranganSimulasi</a:t>
+              </a:r>
+              <a:endParaRPr lang="id-ID" sz="1600" i="1" dirty="0"/>
+            </a:p>
+          </p:txBody>
+        </p:sp>
+        <p:sp>
+          <p:nvSpPr>
+            <p:cNvPr id="35" name="TextBox 34"/>
+            <p:cNvSpPr txBox="1"/>
+            <p:nvPr/>
+          </p:nvSpPr>
+          <p:spPr>
+            <a:xfrm>
+              <a:off x="3001997" y="4146060"/>
+              <a:ext cx="1374136" cy="338554"/>
+            </a:xfrm>
+            <a:prstGeom prst="rect">
+              <a:avLst/>
+            </a:prstGeom>
+            <a:noFill/>
+            <a:ln w="28575">
+              <a:solidFill>
+                <a:schemeClr val="tx1"/>
+              </a:solidFill>
+              <a:prstDash val="sysDot"/>
+            </a:ln>
+          </p:spPr>
+          <p:txBody>
+            <a:bodyPr wrap="square" rtlCol="0">
+              <a:spAutoFit/>
+            </a:bodyPr>
+            <a:lstStyle/>
+            <a:p>
+              <a:pPr algn="ctr"/>
+              <a:r>
+                <a:rPr lang="en-US" sz="1600" i="1" dirty="0" err="1" smtClean="0"/>
+                <a:t>param</a:t>
+              </a:r>
+              <a:endParaRPr lang="id-ID" sz="1600" i="1" dirty="0" smtClean="0"/>
+            </a:p>
+          </p:txBody>
+        </p:sp>
+        <p:sp>
+          <p:nvSpPr>
+            <p:cNvPr id="50" name="Rectangle 49"/>
+            <p:cNvSpPr/>
+            <p:nvPr/>
+          </p:nvSpPr>
+          <p:spPr>
+            <a:xfrm>
+              <a:off x="707589" y="5957603"/>
+              <a:ext cx="3990919" cy="583651"/>
+            </a:xfrm>
+            <a:prstGeom prst="rect">
+              <a:avLst/>
+            </a:prstGeom>
+            <a:ln w="28575">
+              <a:solidFill>
+                <a:srgbClr val="FF0000"/>
+              </a:solidFill>
+            </a:ln>
+          </p:spPr>
+          <p:style>
+            <a:lnRef idx="2">
+              <a:schemeClr val="accent6"/>
+            </a:lnRef>
+            <a:fillRef idx="1">
+              <a:schemeClr val="lt1"/>
+            </a:fillRef>
+            <a:effectRef idx="0">
+              <a:schemeClr val="accent6"/>
+            </a:effectRef>
+            <a:fontRef idx="minor">
+              <a:schemeClr val="dk1"/>
+            </a:fontRef>
+          </p:style>
+          <p:txBody>
+            <a:bodyPr rtlCol="0" anchor="t"/>
+            <a:lstStyle/>
+            <a:p>
+              <a:pPr algn="ctr"/>
+              <a:r>
+                <a:rPr lang="en-US" sz="1600" i="1" dirty="0" err="1" smtClean="0"/>
+                <a:t>SQRshadow</a:t>
+              </a:r>
+              <a:endParaRPr lang="id-ID" sz="1600" i="1" dirty="0"/>
+            </a:p>
+          </p:txBody>
+        </p:sp>
+        <p:sp>
+          <p:nvSpPr>
+            <p:cNvPr id="52" name="TextBox 51"/>
+            <p:cNvSpPr txBox="1"/>
+            <p:nvPr/>
+          </p:nvSpPr>
+          <p:spPr>
+            <a:xfrm>
+              <a:off x="2286208" y="6201655"/>
+              <a:ext cx="848948" cy="276999"/>
+            </a:xfrm>
+            <a:prstGeom prst="rect">
+              <a:avLst/>
+            </a:prstGeom>
+            <a:noFill/>
+          </p:spPr>
+          <p:txBody>
+            <a:bodyPr wrap="square" rtlCol="0">
+              <a:spAutoFit/>
+            </a:bodyPr>
+            <a:lstStyle/>
+            <a:p>
+              <a:r>
+                <a:rPr lang="en-US" sz="1200" dirty="0" smtClean="0"/>
+                <a:t>----//----</a:t>
+              </a:r>
+              <a:endParaRPr lang="en-US" dirty="0" smtClean="0"/>
+            </a:p>
+          </p:txBody>
+        </p:sp>
+      </p:grpSp>
+      <p:sp>
+        <p:nvSpPr>
+          <p:cNvPr id="38" name="TextBox 37"/>
+          <p:cNvSpPr txBox="1"/>
+          <p:nvPr/>
+        </p:nvSpPr>
+        <p:spPr>
+          <a:xfrm>
+            <a:off x="2937708" y="4616838"/>
+            <a:ext cx="1537347" cy="338554"/>
+          </a:xfrm>
+          <a:prstGeom prst="rect">
+            <a:avLst/>
+          </a:prstGeom>
+          <a:noFill/>
+          <a:ln w="28575">
+            <a:solidFill>
+              <a:schemeClr val="tx1"/>
+            </a:solidFill>
+            <a:prstDash val="sysDot"/>
+          </a:ln>
+        </p:spPr>
+        <p:txBody>
+          <a:bodyPr wrap="square" rtlCol="0">
+            <a:spAutoFit/>
+          </a:bodyPr>
+          <a:lstStyle/>
+          <a:p>
+            <a:pPr algn="ctr"/>
+            <a:r>
+              <a:rPr lang="en-US" sz="1600" i="1" dirty="0" err="1" smtClean="0"/>
+              <a:t>timeSeries</a:t>
+            </a:r>
+            <a:endParaRPr lang="id-ID" sz="1600" i="1" dirty="0" smtClean="0"/>
+          </a:p>
+        </p:txBody>
+      </p:sp>
+      <p:sp>
+        <p:nvSpPr>
+          <p:cNvPr id="45" name="TextBox 44"/>
+          <p:cNvSpPr txBox="1"/>
+          <p:nvPr/>
+        </p:nvSpPr>
+        <p:spPr>
+          <a:xfrm>
+            <a:off x="1170891" y="4135842"/>
+            <a:ext cx="1349496" cy="338554"/>
+          </a:xfrm>
+          <a:prstGeom prst="rect">
+            <a:avLst/>
+          </a:prstGeom>
+          <a:noFill/>
+          <a:ln w="28575">
+            <a:solidFill>
+              <a:schemeClr val="tx1"/>
+            </a:solidFill>
+            <a:prstDash val="sysDot"/>
+          </a:ln>
+        </p:spPr>
+        <p:txBody>
+          <a:bodyPr wrap="square" rtlCol="0">
+            <a:spAutoFit/>
+          </a:bodyPr>
+          <a:lstStyle/>
+          <a:p>
+            <a:pPr algn="ctr"/>
+            <a:r>
+              <a:rPr lang="en-US" sz="1600" i="1" dirty="0" smtClean="0"/>
+              <a:t>figure</a:t>
+            </a:r>
+            <a:endParaRPr lang="id-ID" sz="1600" i="1" dirty="0" smtClean="0"/>
+          </a:p>
+        </p:txBody>
+      </p:sp>
+      <p:sp>
+        <p:nvSpPr>
+          <p:cNvPr id="47" name="TextBox 46"/>
+          <p:cNvSpPr txBox="1"/>
+          <p:nvPr/>
+        </p:nvSpPr>
+        <p:spPr>
+          <a:xfrm>
+            <a:off x="1038227" y="4608756"/>
+            <a:ext cx="1542276" cy="338554"/>
+          </a:xfrm>
+          <a:prstGeom prst="rect">
+            <a:avLst/>
+          </a:prstGeom>
+          <a:noFill/>
+          <a:ln w="28575">
+            <a:solidFill>
+              <a:schemeClr val="tx1"/>
+            </a:solidFill>
+            <a:prstDash val="sysDot"/>
+          </a:ln>
+        </p:spPr>
+        <p:txBody>
+          <a:bodyPr wrap="square" rtlCol="0">
+            <a:spAutoFit/>
+          </a:bodyPr>
+          <a:lstStyle/>
+          <a:p>
+            <a:pPr algn="ctr"/>
+            <a:r>
+              <a:rPr lang="en-US" sz="1600" i="1" dirty="0" err="1" smtClean="0"/>
+              <a:t>peakInfo</a:t>
+            </a:r>
+            <a:endParaRPr lang="id-ID" sz="1600" i="1" dirty="0" smtClean="0"/>
+          </a:p>
+        </p:txBody>
+      </p:sp>
+      <p:sp>
+        <p:nvSpPr>
+          <p:cNvPr id="53" name="Rectangle 52"/>
+          <p:cNvSpPr/>
+          <p:nvPr/>
+        </p:nvSpPr>
+        <p:spPr>
+          <a:xfrm>
+            <a:off x="871824" y="5183307"/>
+            <a:ext cx="3747043" cy="434617"/>
+          </a:xfrm>
+          <a:prstGeom prst="rect">
+            <a:avLst/>
+          </a:prstGeom>
+          <a:ln w="28575">
+            <a:solidFill>
+              <a:schemeClr val="tx1"/>
+            </a:solidFill>
+            <a:prstDash val="dash"/>
+          </a:ln>
+        </p:spPr>
+        <p:style>
+          <a:lnRef idx="2">
+            <a:schemeClr val="accent6"/>
+          </a:lnRef>
+          <a:fillRef idx="1">
+            <a:schemeClr val="lt1"/>
+          </a:fillRef>
+          <a:effectRef idx="0">
+            <a:schemeClr val="accent6"/>
+          </a:effectRef>
+          <a:fontRef idx="minor">
+            <a:schemeClr val="dk1"/>
+          </a:fontRef>
+        </p:style>
+        <p:txBody>
+          <a:bodyPr rtlCol="0" anchor="t"/>
+          <a:lstStyle/>
+          <a:p>
+            <a:pPr algn="ctr"/>
+            <a:r>
+              <a:rPr lang="en-US" sz="1600" i="1" dirty="0" smtClean="0"/>
+              <a:t>tanggalTerakhirFitting2keteranganSimulasi</a:t>
+            </a:r>
+            <a:endParaRPr lang="id-ID" sz="1600" i="1" dirty="0"/>
+          </a:p>
+        </p:txBody>
+      </p:sp>
+      <p:grpSp>
+        <p:nvGrpSpPr>
+          <p:cNvPr id="5" name="Group 4"/>
+          <p:cNvGrpSpPr/>
+          <p:nvPr/>
+        </p:nvGrpSpPr>
+        <p:grpSpPr>
+          <a:xfrm>
+            <a:off x="8836696" y="3159613"/>
+            <a:ext cx="3243282" cy="3591557"/>
+            <a:chOff x="8836696" y="3159613"/>
+            <a:chExt cx="3243282" cy="3591557"/>
+          </a:xfrm>
+        </p:grpSpPr>
+        <p:sp>
+          <p:nvSpPr>
+            <p:cNvPr id="60" name="Rectangle 59"/>
+            <p:cNvSpPr/>
+            <p:nvPr/>
+          </p:nvSpPr>
+          <p:spPr>
+            <a:xfrm>
+              <a:off x="8836696" y="3159613"/>
+              <a:ext cx="3243282" cy="3591557"/>
+            </a:xfrm>
+            <a:prstGeom prst="rect">
+              <a:avLst/>
+            </a:prstGeom>
+            <a:ln w="28575"/>
+          </p:spPr>
+          <p:style>
+            <a:lnRef idx="2">
+              <a:schemeClr val="accent5"/>
+            </a:lnRef>
+            <a:fillRef idx="1">
+              <a:schemeClr val="lt1"/>
+            </a:fillRef>
+            <a:effectRef idx="0">
+              <a:schemeClr val="accent5"/>
+            </a:effectRef>
+            <a:fontRef idx="minor">
+              <a:schemeClr val="dk1"/>
+            </a:fontRef>
+          </p:style>
+          <p:txBody>
+            <a:bodyPr rtlCol="0" anchor="t"/>
+            <a:lstStyle/>
+            <a:p>
+              <a:pPr algn="ctr"/>
+              <a:r>
+                <a:rPr lang="en-US" sz="2400" i="1" dirty="0" smtClean="0"/>
+                <a:t>models</a:t>
+              </a:r>
+              <a:endParaRPr lang="id-ID" sz="2400" i="1" dirty="0"/>
+            </a:p>
+          </p:txBody>
+        </p:sp>
+        <p:grpSp>
+          <p:nvGrpSpPr>
+            <p:cNvPr id="43" name="Group 42"/>
+            <p:cNvGrpSpPr/>
+            <p:nvPr/>
+          </p:nvGrpSpPr>
+          <p:grpSpPr>
+            <a:xfrm>
+              <a:off x="9072656" y="5191142"/>
+              <a:ext cx="2875991" cy="707322"/>
+              <a:chOff x="9204357" y="5340923"/>
+              <a:chExt cx="2875991" cy="579693"/>
+            </a:xfrm>
+          </p:grpSpPr>
+          <p:sp>
+            <p:nvSpPr>
+              <p:cNvPr id="26" name="Rectangle 25"/>
+              <p:cNvSpPr/>
+              <p:nvPr/>
+            </p:nvSpPr>
+            <p:spPr>
+              <a:xfrm>
+                <a:off x="9204357" y="5340923"/>
+                <a:ext cx="2875991" cy="579692"/>
+              </a:xfrm>
+              <a:prstGeom prst="rect">
+                <a:avLst/>
+              </a:prstGeom>
+              <a:ln w="38100">
+                <a:solidFill>
+                  <a:srgbClr val="FF0000"/>
+                </a:solidFill>
+              </a:ln>
+            </p:spPr>
+            <p:style>
+              <a:lnRef idx="2">
+                <a:schemeClr val="accent6"/>
+              </a:lnRef>
+              <a:fillRef idx="1">
+                <a:schemeClr val="lt1"/>
+              </a:fillRef>
+              <a:effectRef idx="0">
+                <a:schemeClr val="accent6"/>
+              </a:effectRef>
+              <a:fontRef idx="minor">
+                <a:schemeClr val="dk1"/>
+              </a:fontRef>
+            </p:style>
+            <p:txBody>
+              <a:bodyPr rtlCol="0" anchor="t"/>
+              <a:lstStyle/>
+              <a:p>
+                <a:pPr algn="ctr"/>
+                <a:r>
+                  <a:rPr lang="en-US" i="1" dirty="0" err="1" smtClean="0"/>
+                  <a:t>SQRshadow</a:t>
+                </a:r>
+                <a:endParaRPr lang="id-ID" i="1" dirty="0"/>
+              </a:p>
+            </p:txBody>
+          </p:sp>
+          <p:sp>
+            <p:nvSpPr>
+              <p:cNvPr id="27" name="TextBox 26"/>
+              <p:cNvSpPr txBox="1"/>
+              <p:nvPr/>
+            </p:nvSpPr>
+            <p:spPr>
+              <a:xfrm>
+                <a:off x="9269607" y="5617924"/>
+                <a:ext cx="2387856" cy="302690"/>
+              </a:xfrm>
+              <a:prstGeom prst="rect">
+                <a:avLst/>
+              </a:prstGeom>
+              <a:noFill/>
+            </p:spPr>
+            <p:txBody>
+              <a:bodyPr wrap="square" rtlCol="0">
+                <a:spAutoFit/>
+              </a:bodyPr>
+              <a:lstStyle/>
+              <a:p>
+                <a:pPr algn="ctr"/>
+                <a:r>
+                  <a:rPr lang="en-US" dirty="0"/>
+                  <a:t>----//----</a:t>
+                </a:r>
+              </a:p>
+            </p:txBody>
+          </p:sp>
+        </p:grpSp>
+        <p:grpSp>
+          <p:nvGrpSpPr>
+            <p:cNvPr id="40" name="Group 39"/>
+            <p:cNvGrpSpPr/>
+            <p:nvPr/>
+          </p:nvGrpSpPr>
+          <p:grpSpPr>
+            <a:xfrm>
+              <a:off x="9069030" y="3689618"/>
+              <a:ext cx="2886753" cy="1646371"/>
+              <a:chOff x="9168513" y="3750973"/>
+              <a:chExt cx="2875991" cy="1389747"/>
+            </a:xfrm>
+          </p:grpSpPr>
+          <p:sp>
+            <p:nvSpPr>
+              <p:cNvPr id="19" name="Rectangle 18"/>
+              <p:cNvSpPr/>
+              <p:nvPr/>
+            </p:nvSpPr>
+            <p:spPr>
+              <a:xfrm>
+                <a:off x="9168513" y="3750973"/>
+                <a:ext cx="2875991" cy="1210300"/>
+              </a:xfrm>
+              <a:prstGeom prst="rect">
+                <a:avLst/>
+              </a:prstGeom>
+              <a:ln w="38100">
+                <a:solidFill>
+                  <a:srgbClr val="FF0000"/>
+                </a:solidFill>
+              </a:ln>
+            </p:spPr>
+            <p:style>
+              <a:lnRef idx="2">
+                <a:schemeClr val="accent6"/>
+              </a:lnRef>
+              <a:fillRef idx="1">
+                <a:schemeClr val="lt1"/>
+              </a:fillRef>
+              <a:effectRef idx="0">
+                <a:schemeClr val="accent6"/>
+              </a:effectRef>
+              <a:fontRef idx="minor">
+                <a:schemeClr val="dk1"/>
+              </a:fontRef>
+            </p:style>
+            <p:txBody>
+              <a:bodyPr rtlCol="0" anchor="t"/>
+              <a:lstStyle/>
+              <a:p>
+                <a:pPr algn="ctr"/>
+                <a:r>
+                  <a:rPr lang="en-US" i="1" dirty="0" smtClean="0"/>
+                  <a:t>SIRQN</a:t>
+                </a:r>
+                <a:endParaRPr lang="id-ID" i="1" dirty="0"/>
+              </a:p>
+            </p:txBody>
+          </p:sp>
+          <p:sp>
+            <p:nvSpPr>
+              <p:cNvPr id="20" name="TextBox 19"/>
+              <p:cNvSpPr txBox="1"/>
+              <p:nvPr/>
+            </p:nvSpPr>
+            <p:spPr>
+              <a:xfrm>
+                <a:off x="9219327" y="3940390"/>
+                <a:ext cx="2810740" cy="1200329"/>
+              </a:xfrm>
+              <a:prstGeom prst="rect">
+                <a:avLst/>
+              </a:prstGeom>
+              <a:noFill/>
+            </p:spPr>
+            <p:txBody>
+              <a:bodyPr wrap="square" rtlCol="0">
+                <a:spAutoFit/>
+              </a:bodyPr>
+              <a:lstStyle/>
+              <a:p>
+                <a:r>
+                  <a:rPr lang="en-US" dirty="0" err="1" smtClean="0"/>
+                  <a:t>fOde.m</a:t>
+                </a:r>
+                <a:endParaRPr lang="en-US" dirty="0" smtClean="0"/>
+              </a:p>
+              <a:p>
+                <a:r>
+                  <a:rPr lang="en-US" dirty="0" smtClean="0"/>
+                  <a:t>calcR0.m</a:t>
+                </a:r>
+              </a:p>
+              <a:p>
+                <a:r>
+                  <a:rPr lang="en-US" dirty="0"/>
+                  <a:t>c</a:t>
+                </a:r>
+                <a:r>
+                  <a:rPr lang="en-US" dirty="0" smtClean="0"/>
+                  <a:t>onfig.txt</a:t>
+                </a:r>
+              </a:p>
+              <a:p>
+                <a:r>
+                  <a:rPr lang="en-US" dirty="0" smtClean="0"/>
+                  <a:t>PenjelasanModel.docx</a:t>
+                </a:r>
+              </a:p>
+            </p:txBody>
+          </p:sp>
+        </p:grpSp>
+        <p:grpSp>
+          <p:nvGrpSpPr>
+            <p:cNvPr id="64" name="Group 63"/>
+            <p:cNvGrpSpPr/>
+            <p:nvPr/>
+          </p:nvGrpSpPr>
+          <p:grpSpPr>
+            <a:xfrm>
+              <a:off x="9092875" y="5962005"/>
+              <a:ext cx="2875991" cy="707322"/>
+              <a:chOff x="9204357" y="5340923"/>
+              <a:chExt cx="2875991" cy="579693"/>
+            </a:xfrm>
+          </p:grpSpPr>
+          <p:sp>
+            <p:nvSpPr>
+              <p:cNvPr id="65" name="Rectangle 64"/>
+              <p:cNvSpPr/>
+              <p:nvPr/>
+            </p:nvSpPr>
+            <p:spPr>
+              <a:xfrm>
+                <a:off x="9204357" y="5340923"/>
+                <a:ext cx="2875991" cy="579692"/>
+              </a:xfrm>
+              <a:prstGeom prst="rect">
+                <a:avLst/>
+              </a:prstGeom>
+              <a:ln w="38100">
+                <a:solidFill>
+                  <a:srgbClr val="FF0000"/>
+                </a:solidFill>
+              </a:ln>
+            </p:spPr>
+            <p:style>
+              <a:lnRef idx="2">
+                <a:schemeClr val="accent6"/>
+              </a:lnRef>
+              <a:fillRef idx="1">
+                <a:schemeClr val="lt1"/>
+              </a:fillRef>
+              <a:effectRef idx="0">
+                <a:schemeClr val="accent6"/>
+              </a:effectRef>
+              <a:fontRef idx="minor">
+                <a:schemeClr val="dk1"/>
+              </a:fontRef>
+            </p:style>
+            <p:txBody>
+              <a:bodyPr rtlCol="0" anchor="t"/>
+              <a:lstStyle/>
+              <a:p>
+                <a:pPr algn="ctr"/>
+                <a:r>
+                  <a:rPr lang="en-US" i="1" dirty="0" smtClean="0"/>
+                  <a:t>8Kompartemen</a:t>
+                </a:r>
+                <a:endParaRPr lang="id-ID" i="1" dirty="0"/>
+              </a:p>
+            </p:txBody>
+          </p:sp>
+          <p:sp>
+            <p:nvSpPr>
+              <p:cNvPr id="66" name="TextBox 65"/>
+              <p:cNvSpPr txBox="1"/>
+              <p:nvPr/>
+            </p:nvSpPr>
+            <p:spPr>
+              <a:xfrm>
+                <a:off x="9269607" y="5617924"/>
+                <a:ext cx="2387856" cy="302690"/>
+              </a:xfrm>
+              <a:prstGeom prst="rect">
+                <a:avLst/>
+              </a:prstGeom>
+              <a:noFill/>
+            </p:spPr>
+            <p:txBody>
+              <a:bodyPr wrap="square" rtlCol="0">
+                <a:spAutoFit/>
+              </a:bodyPr>
+              <a:lstStyle/>
+              <a:p>
+                <a:pPr algn="ctr"/>
+                <a:r>
+                  <a:rPr lang="en-US" dirty="0"/>
+                  <a:t>----//----</a:t>
+                </a:r>
+              </a:p>
+            </p:txBody>
+          </p:sp>
+        </p:grpSp>
+      </p:grpSp>
+    </p:spTree>
+    <p:extLst>
+      <p:ext uri="{BB962C8B-B14F-4D97-AF65-F5344CB8AC3E}">
+        <p14:creationId xmlns:p14="http://schemas.microsoft.com/office/powerpoint/2010/main" val="1765010079"/>
+      </p:ext>
+    </p:extLst>
+  </p:cSld>
+  <p:clrMapOvr>
+    <a:masterClrMapping/>
+  </p:clrMapOvr>
+</p:sld>
+</file>
+
+<file path=ppt/slides/slide2.xml><?xml version="1.0" encoding="utf-8"?>
+<p:sld xmlns:a="http://schemas.openxmlformats.org/drawingml/2006/main" xmlns:r="http://schemas.openxmlformats.org/officeDocument/2006/relationships" xmlns:p="http://schemas.openxmlformats.org/presentationml/2006/main">
+  <p:cSld>
+    <p:spTree>
+      <p:nvGrpSpPr>
+        <p:cNvPr id="1" name=""/>
+        <p:cNvGrpSpPr/>
+        <p:nvPr/>
+      </p:nvGrpSpPr>
+      <p:grpSpPr>
+        <a:xfrm>
+          <a:off x="0" y="0"/>
+          <a:ext cx="0" cy="0"/>
+          <a:chOff x="0" y="0"/>
+          <a:chExt cx="0" cy="0"/>
+        </a:xfrm>
+      </p:grpSpPr>
+      <p:grpSp>
+        <p:nvGrpSpPr>
           <p:cNvPr id="18" name="Group 17"/>
           <p:cNvGrpSpPr/>
           <p:nvPr/>
@@ -3284,7 +4638,6 @@
                 <a:rPr lang="en-US" dirty="0" smtClean="0"/>
                 <a:t>calcR0.m</a:t>
               </a:r>
-              <a:endParaRPr lang="en-US" dirty="0" smtClean="0"/>
             </a:p>
             <a:p>
               <a:r>
@@ -3644,7 +4997,6 @@
                 <a:rPr lang="en-US" dirty="0" smtClean="0"/>
                 <a:t>calcR0.m</a:t>
               </a:r>
-              <a:endParaRPr lang="en-US" dirty="0" smtClean="0"/>
             </a:p>
             <a:p>
               <a:r>
@@ -4471,7 +5823,7 @@
     </p:spTree>
     <p:extLst>
       <p:ext uri="{BB962C8B-B14F-4D97-AF65-F5344CB8AC3E}">
-        <p14:creationId xmlns:p14="http://schemas.microsoft.com/office/powerpoint/2010/main" val="1765010079"/>
+        <p14:creationId xmlns:p14="http://schemas.microsoft.com/office/powerpoint/2010/main" val="2725407238"/>
       </p:ext>
     </p:extLst>
   </p:cSld>
@@ -4481,7 +5833,7 @@
 </p:sld>
 </file>
 
-<file path=ppt/slides/slide2.xml><?xml version="1.0" encoding="utf-8"?>
+<file path=ppt/slides/slide3.xml><?xml version="1.0" encoding="utf-8"?>
 <p:sld xmlns:a="http://schemas.openxmlformats.org/drawingml/2006/main" xmlns:r="http://schemas.openxmlformats.org/officeDocument/2006/relationships" xmlns:p="http://schemas.openxmlformats.org/presentationml/2006/main">
   <p:cSld>
     <p:spTree>

</xml_diff>